<commit_message>
Modified presentation & userguide
</commit_message>
<xml_diff>
--- a/docs/presentation/gentoo_installer_presentation.pptx
+++ b/docs/presentation/gentoo_installer_presentation.pptx
@@ -15927,7 +15927,7 @@
                   <a:srgbClr val="FFFFFF"/>
                 </a:solidFill>
               </a:rPr>
-              <a:t>Installation le temps d’un (grand) café</a:t>
+              <a:t>Installation le temps d’un (Long) café</a:t>
             </a:r>
           </a:p>
         </p:txBody>
@@ -20611,12 +20611,100 @@
             </a:r>
             <a:r>
               <a:rPr lang="en-US" dirty="0"/>
+              <a:t> ! </a:t>
+            </a:r>
+          </a:p>
+          <a:p>
+            <a:pPr marL="0" indent="0">
+              <a:buNone/>
+            </a:pPr>
+            <a:endParaRPr lang="en-US" dirty="0"/>
+          </a:p>
+          <a:p>
+            <a:pPr marL="0" indent="0">
+              <a:buNone/>
+            </a:pPr>
+            <a:r>
+              <a:rPr lang="en-US" dirty="0"/>
+              <a:t>Nous </a:t>
+            </a:r>
+            <a:r>
+              <a:rPr lang="en-US" dirty="0" err="1"/>
+              <a:t>avons</a:t>
+            </a:r>
+            <a:r>
+              <a:rPr lang="en-US" dirty="0"/>
               <a:t> </a:t>
             </a:r>
             <a:r>
-              <a:rPr lang="en-US"/>
-              <a:t>! </a:t>
+              <a:rPr lang="en-US" dirty="0" err="1"/>
+              <a:t>aussi</a:t>
             </a:r>
+            <a:r>
+              <a:rPr lang="en-US" dirty="0"/>
+              <a:t> </a:t>
+            </a:r>
+            <a:r>
+              <a:rPr lang="en-US" dirty="0" err="1"/>
+              <a:t>pu</a:t>
+            </a:r>
+            <a:r>
+              <a:rPr lang="en-US" dirty="0"/>
+              <a:t> </a:t>
+            </a:r>
+            <a:r>
+              <a:rPr lang="en-US" dirty="0" err="1"/>
+              <a:t>réaliser</a:t>
+            </a:r>
+            <a:r>
+              <a:rPr lang="en-US" dirty="0"/>
+              <a:t> 5 installations </a:t>
+            </a:r>
+            <a:r>
+              <a:rPr lang="en-US" dirty="0" err="1"/>
+              <a:t>en</a:t>
+            </a:r>
+            <a:r>
+              <a:rPr lang="en-US" dirty="0"/>
+              <a:t> </a:t>
+            </a:r>
+            <a:r>
+              <a:rPr lang="en-US" dirty="0" err="1"/>
+              <a:t>une</a:t>
+            </a:r>
+            <a:r>
+              <a:rPr lang="en-US" dirty="0"/>
+              <a:t> après-midi, </a:t>
+            </a:r>
+            <a:r>
+              <a:rPr lang="en-US" dirty="0" err="1"/>
+              <a:t>ce</a:t>
+            </a:r>
+            <a:r>
+              <a:rPr lang="en-US" dirty="0"/>
+              <a:t> qui </a:t>
+            </a:r>
+            <a:r>
+              <a:rPr lang="en-US" dirty="0" err="1"/>
+              <a:t>serait</a:t>
+            </a:r>
+            <a:r>
+              <a:rPr lang="en-US" dirty="0"/>
+              <a:t> impossible avec </a:t>
+            </a:r>
+            <a:r>
+              <a:rPr lang="en-US" dirty="0" err="1"/>
+              <a:t>une</a:t>
+            </a:r>
+            <a:r>
+              <a:rPr lang="en-US" dirty="0"/>
+              <a:t> configuration/installation </a:t>
+            </a:r>
+            <a:r>
+              <a:rPr lang="en-US" dirty="0" err="1"/>
+              <a:t>manuelle</a:t>
+            </a:r>
+            <a:endParaRPr lang="en-US" dirty="0"/>
           </a:p>
           <a:p>
             <a:pPr marL="0" indent="0">

</xml_diff>